<commit_message>
Cambiado disenyo de las cartas
</commit_message>
<xml_diff>
--- a/app/src/powerpoint para cartas/Presentación2.pptx
+++ b/app/src/powerpoint para cartas/Presentación2.pptx
@@ -302,7 +302,7 @@
           <a:p>
             <a:fld id="{ED5068BE-CC48-4432-805D-8C4C4168F1D3}" type="datetimeFigureOut">
               <a:rPr lang="es-ES" smtClean="0"/>
-              <a:t>08/05/2020</a:t>
+              <a:t>22/05/2020</a:t>
             </a:fld>
             <a:endParaRPr lang="es-ES"/>
           </a:p>
@@ -465,7 +465,7 @@
           <a:p>
             <a:fld id="{ED5068BE-CC48-4432-805D-8C4C4168F1D3}" type="datetimeFigureOut">
               <a:rPr lang="es-ES" smtClean="0"/>
-              <a:t>08/05/2020</a:t>
+              <a:t>22/05/2020</a:t>
             </a:fld>
             <a:endParaRPr lang="es-ES"/>
           </a:p>
@@ -638,7 +638,7 @@
           <a:p>
             <a:fld id="{ED5068BE-CC48-4432-805D-8C4C4168F1D3}" type="datetimeFigureOut">
               <a:rPr lang="es-ES" smtClean="0"/>
-              <a:t>08/05/2020</a:t>
+              <a:t>22/05/2020</a:t>
             </a:fld>
             <a:endParaRPr lang="es-ES"/>
           </a:p>
@@ -801,7 +801,7 @@
           <a:p>
             <a:fld id="{ED5068BE-CC48-4432-805D-8C4C4168F1D3}" type="datetimeFigureOut">
               <a:rPr lang="es-ES" smtClean="0"/>
-              <a:t>08/05/2020</a:t>
+              <a:t>22/05/2020</a:t>
             </a:fld>
             <a:endParaRPr lang="es-ES"/>
           </a:p>
@@ -1041,7 +1041,7 @@
           <a:p>
             <a:fld id="{ED5068BE-CC48-4432-805D-8C4C4168F1D3}" type="datetimeFigureOut">
               <a:rPr lang="es-ES" smtClean="0"/>
-              <a:t>08/05/2020</a:t>
+              <a:t>22/05/2020</a:t>
             </a:fld>
             <a:endParaRPr lang="es-ES"/>
           </a:p>
@@ -1321,7 +1321,7 @@
           <a:p>
             <a:fld id="{ED5068BE-CC48-4432-805D-8C4C4168F1D3}" type="datetimeFigureOut">
               <a:rPr lang="es-ES" smtClean="0"/>
-              <a:t>08/05/2020</a:t>
+              <a:t>22/05/2020</a:t>
             </a:fld>
             <a:endParaRPr lang="es-ES"/>
           </a:p>
@@ -1735,7 +1735,7 @@
           <a:p>
             <a:fld id="{ED5068BE-CC48-4432-805D-8C4C4168F1D3}" type="datetimeFigureOut">
               <a:rPr lang="es-ES" smtClean="0"/>
-              <a:t>08/05/2020</a:t>
+              <a:t>22/05/2020</a:t>
             </a:fld>
             <a:endParaRPr lang="es-ES"/>
           </a:p>
@@ -1847,7 +1847,7 @@
           <a:p>
             <a:fld id="{ED5068BE-CC48-4432-805D-8C4C4168F1D3}" type="datetimeFigureOut">
               <a:rPr lang="es-ES" smtClean="0"/>
-              <a:t>08/05/2020</a:t>
+              <a:t>22/05/2020</a:t>
             </a:fld>
             <a:endParaRPr lang="es-ES"/>
           </a:p>
@@ -1937,7 +1937,7 @@
           <a:p>
             <a:fld id="{ED5068BE-CC48-4432-805D-8C4C4168F1D3}" type="datetimeFigureOut">
               <a:rPr lang="es-ES" smtClean="0"/>
-              <a:t>08/05/2020</a:t>
+              <a:t>22/05/2020</a:t>
             </a:fld>
             <a:endParaRPr lang="es-ES"/>
           </a:p>
@@ -2207,7 +2207,7 @@
           <a:p>
             <a:fld id="{ED5068BE-CC48-4432-805D-8C4C4168F1D3}" type="datetimeFigureOut">
               <a:rPr lang="es-ES" smtClean="0"/>
-              <a:t>08/05/2020</a:t>
+              <a:t>22/05/2020</a:t>
             </a:fld>
             <a:endParaRPr lang="es-ES"/>
           </a:p>
@@ -2454,7 +2454,7 @@
           <a:p>
             <a:fld id="{ED5068BE-CC48-4432-805D-8C4C4168F1D3}" type="datetimeFigureOut">
               <a:rPr lang="es-ES" smtClean="0"/>
-              <a:t>08/05/2020</a:t>
+              <a:t>22/05/2020</a:t>
             </a:fld>
             <a:endParaRPr lang="es-ES"/>
           </a:p>
@@ -2660,7 +2660,7 @@
           <a:p>
             <a:fld id="{ED5068BE-CC48-4432-805D-8C4C4168F1D3}" type="datetimeFigureOut">
               <a:rPr lang="es-ES" smtClean="0"/>
-              <a:t>08/05/2020</a:t>
+              <a:t>22/05/2020</a:t>
             </a:fld>
             <a:endParaRPr lang="es-ES"/>
           </a:p>
@@ -3030,113 +3030,42 @@
           <a:chExt cx="0" cy="0"/>
         </a:xfrm>
       </p:grpSpPr>
-      <p:grpSp>
-        <p:nvGrpSpPr>
-          <p:cNvPr id="8" name="7 Grupo"/>
-          <p:cNvGrpSpPr/>
+      <p:pic>
+        <p:nvPicPr>
+          <p:cNvPr id="4" name="Imagen 3">
+            <a:extLst>
+              <a:ext uri="{FF2B5EF4-FFF2-40B4-BE49-F238E27FC236}">
+                <a16:creationId xmlns:a16="http://schemas.microsoft.com/office/drawing/2014/main" id="{55864A73-5E2F-43F7-B0B3-8692914CE411}"/>
+              </a:ext>
+            </a:extLst>
+          </p:cNvPr>
+          <p:cNvPicPr>
+            <a:picLocks noChangeAspect="1"/>
+          </p:cNvPicPr>
           <p:nvPr/>
-        </p:nvGrpSpPr>
-        <p:grpSpPr>
-          <a:xfrm>
-            <a:off x="2847975" y="857250"/>
-            <a:ext cx="3448050" cy="5143500"/>
-            <a:chOff x="2847975" y="857250"/>
-            <a:chExt cx="3448050" cy="5143500"/>
-          </a:xfrm>
-        </p:grpSpPr>
-        <p:pic>
-          <p:nvPicPr>
-            <p:cNvPr id="1026" name="Picture 2"/>
-            <p:cNvPicPr>
-              <a:picLocks noChangeAspect="1" noChangeArrowheads="1"/>
-            </p:cNvPicPr>
-            <p:nvPr/>
-          </p:nvPicPr>
-          <p:blipFill>
-            <a:blip r:embed="rId2"/>
-            <a:srcRect/>
-            <a:stretch>
-              <a:fillRect/>
-            </a:stretch>
-          </p:blipFill>
-          <p:spPr bwMode="auto">
-            <a:xfrm>
-              <a:off x="2847975" y="857250"/>
-              <a:ext cx="3448050" cy="5143500"/>
-            </a:xfrm>
-            <a:prstGeom prst="rect">
-              <a:avLst/>
-            </a:prstGeom>
-            <a:noFill/>
-            <a:ln w="9525">
-              <a:noFill/>
-              <a:miter lim="800000"/>
-              <a:headEnd/>
-              <a:tailEnd/>
-            </a:ln>
-            <a:effectLst/>
-          </p:spPr>
-        </p:pic>
-        <p:sp>
-          <p:nvSpPr>
-            <p:cNvPr id="6" name="5 Rectángulo"/>
-            <p:cNvSpPr/>
-            <p:nvPr/>
-          </p:nvSpPr>
-          <p:spPr>
-            <a:xfrm>
-              <a:off x="3000364" y="1000108"/>
-              <a:ext cx="3143272" cy="4857784"/>
-            </a:xfrm>
-            <a:prstGeom prst="rect">
-              <a:avLst/>
-            </a:prstGeom>
-            <a:gradFill flip="none" rotWithShape="1">
-              <a:gsLst>
-                <a:gs pos="93000">
-                  <a:schemeClr val="bg1"/>
-                </a:gs>
-                <a:gs pos="100000">
-                  <a:schemeClr val="bg1">
-                    <a:alpha val="0"/>
-                  </a:schemeClr>
-                </a:gs>
-              </a:gsLst>
-              <a:path path="shape">
-                <a:fillToRect l="50000" t="50000" r="50000" b="50000"/>
-              </a:path>
-              <a:tileRect/>
-            </a:gradFill>
-            <a:ln>
-              <a:noFill/>
-            </a:ln>
-          </p:spPr>
-          <p:style>
-            <a:lnRef idx="2">
-              <a:schemeClr val="accent1">
-                <a:shade val="50000"/>
-              </a:schemeClr>
-            </a:lnRef>
-            <a:fillRef idx="1">
-              <a:schemeClr val="accent1"/>
-            </a:fillRef>
-            <a:effectRef idx="0">
-              <a:schemeClr val="accent1"/>
-            </a:effectRef>
-            <a:fontRef idx="minor">
-              <a:schemeClr val="lt1"/>
-            </a:fontRef>
-          </p:style>
-          <p:txBody>
-            <a:bodyPr rtlCol="0" anchor="ctr"/>
-            <a:lstStyle/>
-            <a:p>
-              <a:pPr algn="ctr"/>
-              <a:endParaRPr lang="es-ES"/>
-            </a:p>
-          </p:txBody>
-        </p:sp>
-      </p:grpSp>
+        </p:nvPicPr>
+        <p:blipFill>
+          <a:blip r:embed="rId2">
+            <a:extLst>
+              <a:ext uri="{28A0092B-C50C-407E-A947-70E740481C1C}">
+                <a14:useLocalDpi xmlns:a14="http://schemas.microsoft.com/office/drawing/2010/main" val="0"/>
+              </a:ext>
+            </a:extLst>
+          </a:blip>
+          <a:stretch>
+            <a:fillRect/>
+          </a:stretch>
+        </p:blipFill>
+        <p:spPr>
+          <a:xfrm>
+            <a:off x="2798381" y="857250"/>
+            <a:ext cx="3547238" cy="5143500"/>
+          </a:xfrm>
+          <a:prstGeom prst="rect">
+            <a:avLst/>
+          </a:prstGeom>
+        </p:spPr>
+      </p:pic>
       <p:sp>
         <p:nvSpPr>
           <p:cNvPr id="9" name="AutoShape 14" descr="BMW Z4 Price, Images, Reviews and Specs">
@@ -3153,7 +3082,7 @@
         </p:nvSpPr>
         <p:spPr bwMode="auto">
           <a:xfrm>
-            <a:off x="4419600" y="3276600"/>
+            <a:off x="459161" y="2484513"/>
             <a:ext cx="304800" cy="304800"/>
           </a:xfrm>
           <a:prstGeom prst="rect">
@@ -3211,8 +3140,8 @@
         </p:blipFill>
         <p:spPr bwMode="auto">
           <a:xfrm flipH="1">
-            <a:off x="3259906" y="2534163"/>
-            <a:ext cx="2926670" cy="1874110"/>
+            <a:off x="-2268760" y="5561145"/>
+            <a:ext cx="1677198" cy="1074003"/>
           </a:xfrm>
           <a:prstGeom prst="rect">
             <a:avLst/>
@@ -3257,8 +3186,8 @@
         </p:blipFill>
         <p:spPr>
           <a:xfrm>
-            <a:off x="3205755" y="2845589"/>
-            <a:ext cx="2926671" cy="1251258"/>
+            <a:off x="-1692696" y="2503612"/>
+            <a:ext cx="1322917" cy="565595"/>
           </a:xfrm>
           <a:prstGeom prst="rect">
             <a:avLst/>
@@ -3280,7 +3209,7 @@
           <p:nvPr/>
         </p:nvPicPr>
         <p:blipFill>
-          <a:blip r:embed="rId5">
+          <a:blip r:embed="rId5" cstate="print">
             <a:extLst>
               <a:ext uri="{28A0092B-C50C-407E-A947-70E740481C1C}">
                 <a14:useLocalDpi xmlns:a14="http://schemas.microsoft.com/office/drawing/2010/main" val="0"/>
@@ -3293,8 +3222,8 @@
         </p:blipFill>
         <p:spPr>
           <a:xfrm>
-            <a:off x="3083345" y="2653223"/>
-            <a:ext cx="2884507" cy="1635989"/>
+            <a:off x="-2042649" y="4489409"/>
+            <a:ext cx="1337909" cy="758814"/>
           </a:xfrm>
           <a:prstGeom prst="rect">
             <a:avLst/>
@@ -3329,8 +3258,8 @@
         </p:blipFill>
         <p:spPr>
           <a:xfrm>
-            <a:off x="3187379" y="2534161"/>
-            <a:ext cx="2932862" cy="1874111"/>
+            <a:off x="-1980728" y="3441089"/>
+            <a:ext cx="1677197" cy="1071736"/>
           </a:xfrm>
           <a:prstGeom prst="rect">
             <a:avLst/>
@@ -3365,8 +3294,8 @@
         </p:blipFill>
         <p:spPr>
           <a:xfrm>
-            <a:off x="3000364" y="2944148"/>
-            <a:ext cx="3050468" cy="969703"/>
+            <a:off x="-2153556" y="1514836"/>
+            <a:ext cx="1670903" cy="531158"/>
           </a:xfrm>
           <a:prstGeom prst="rect">
             <a:avLst/>
@@ -3401,12 +3330,1029 @@
         </p:blipFill>
         <p:spPr>
           <a:xfrm>
-            <a:off x="3203847" y="2060847"/>
-            <a:ext cx="2736305" cy="2736305"/>
+            <a:off x="-2124744" y="36204"/>
+            <a:ext cx="1642091" cy="1642091"/>
           </a:xfrm>
           <a:prstGeom prst="rect">
             <a:avLst/>
           </a:prstGeom>
+        </p:spPr>
+      </p:pic>
+      <p:pic>
+        <p:nvPicPr>
+          <p:cNvPr id="1026" name="Picture 2" descr="Download Free png Buick Avista Blue Car PNG Image - PngPix - DLPNG.com">
+            <a:extLst>
+              <a:ext uri="{FF2B5EF4-FFF2-40B4-BE49-F238E27FC236}">
+                <a16:creationId xmlns:a16="http://schemas.microsoft.com/office/drawing/2014/main" id="{186AFC97-D116-4E81-B13B-3BBFEAC2BD62}"/>
+              </a:ext>
+            </a:extLst>
+          </p:cNvPr>
+          <p:cNvPicPr>
+            <a:picLocks noChangeAspect="1" noChangeArrowheads="1"/>
+          </p:cNvPicPr>
+          <p:nvPr/>
+        </p:nvPicPr>
+        <p:blipFill>
+          <a:blip r:embed="rId9" cstate="print">
+            <a:extLst>
+              <a:ext uri="{28A0092B-C50C-407E-A947-70E740481C1C}">
+                <a14:useLocalDpi xmlns:a14="http://schemas.microsoft.com/office/drawing/2010/main" val="0"/>
+              </a:ext>
+            </a:extLst>
+          </a:blip>
+          <a:srcRect/>
+          <a:stretch>
+            <a:fillRect/>
+          </a:stretch>
+        </p:blipFill>
+        <p:spPr bwMode="auto">
+          <a:xfrm>
+            <a:off x="132101" y="842599"/>
+            <a:ext cx="941131" cy="522034"/>
+          </a:xfrm>
+          <a:prstGeom prst="rect">
+            <a:avLst/>
+          </a:prstGeom>
+          <a:noFill/>
+          <a:extLst>
+            <a:ext uri="{909E8E84-426E-40DD-AFC4-6F175D3DCCD1}">
+              <a14:hiddenFill xmlns:a14="http://schemas.microsoft.com/office/drawing/2010/main">
+                <a:solidFill>
+                  <a:srgbClr val="FFFFFF"/>
+                </a:solidFill>
+              </a14:hiddenFill>
+            </a:ext>
+          </a:extLst>
+        </p:spPr>
+      </p:pic>
+      <p:pic>
+        <p:nvPicPr>
+          <p:cNvPr id="1028" name="Picture 4" descr="Bugatti Chiron Blue Car PNG Image - PngPix">
+            <a:extLst>
+              <a:ext uri="{FF2B5EF4-FFF2-40B4-BE49-F238E27FC236}">
+                <a16:creationId xmlns:a16="http://schemas.microsoft.com/office/drawing/2014/main" id="{BF279549-71C1-4545-B70E-952E5D5ED8E1}"/>
+              </a:ext>
+            </a:extLst>
+          </p:cNvPr>
+          <p:cNvPicPr>
+            <a:picLocks noChangeAspect="1" noChangeArrowheads="1"/>
+          </p:cNvPicPr>
+          <p:nvPr/>
+        </p:nvPicPr>
+        <p:blipFill>
+          <a:blip r:embed="rId10" cstate="print">
+            <a:extLst>
+              <a:ext uri="{28A0092B-C50C-407E-A947-70E740481C1C}">
+                <a14:useLocalDpi xmlns:a14="http://schemas.microsoft.com/office/drawing/2010/main" val="0"/>
+              </a:ext>
+            </a:extLst>
+          </a:blip>
+          <a:srcRect/>
+          <a:stretch>
+            <a:fillRect/>
+          </a:stretch>
+        </p:blipFill>
+        <p:spPr bwMode="auto">
+          <a:xfrm>
+            <a:off x="-252536" y="1364633"/>
+            <a:ext cx="1558639" cy="850216"/>
+          </a:xfrm>
+          <a:prstGeom prst="rect">
+            <a:avLst/>
+          </a:prstGeom>
+          <a:noFill/>
+          <a:extLst>
+            <a:ext uri="{909E8E84-426E-40DD-AFC4-6F175D3DCCD1}">
+              <a14:hiddenFill xmlns:a14="http://schemas.microsoft.com/office/drawing/2010/main">
+                <a:solidFill>
+                  <a:srgbClr val="FFFFFF"/>
+                </a:solidFill>
+              </a14:hiddenFill>
+            </a:ext>
+          </a:extLst>
+        </p:spPr>
+      </p:pic>
+      <p:pic>
+        <p:nvPicPr>
+          <p:cNvPr id="1030" name="Picture 6" descr="Pink car png, Picture #492468 pink car png">
+            <a:extLst>
+              <a:ext uri="{FF2B5EF4-FFF2-40B4-BE49-F238E27FC236}">
+                <a16:creationId xmlns:a16="http://schemas.microsoft.com/office/drawing/2014/main" id="{9C2056C2-A211-4895-AA88-3A956472ED84}"/>
+              </a:ext>
+            </a:extLst>
+          </p:cNvPr>
+          <p:cNvPicPr>
+            <a:picLocks noChangeAspect="1" noChangeArrowheads="1"/>
+          </p:cNvPicPr>
+          <p:nvPr/>
+        </p:nvPicPr>
+        <p:blipFill rotWithShape="1">
+          <a:blip r:embed="rId11" cstate="print">
+            <a:extLst>
+              <a:ext uri="{28A0092B-C50C-407E-A947-70E740481C1C}">
+                <a14:useLocalDpi xmlns:a14="http://schemas.microsoft.com/office/drawing/2010/main" val="0"/>
+              </a:ext>
+            </a:extLst>
+          </a:blip>
+          <a:srcRect l="3476" r="3740"/>
+          <a:stretch/>
+        </p:blipFill>
+        <p:spPr bwMode="auto">
+          <a:xfrm>
+            <a:off x="-175119" y="2105577"/>
+            <a:ext cx="1878160" cy="1293602"/>
+          </a:xfrm>
+          <a:prstGeom prst="rect">
+            <a:avLst/>
+          </a:prstGeom>
+          <a:noFill/>
+          <a:extLst>
+            <a:ext uri="{909E8E84-426E-40DD-AFC4-6F175D3DCCD1}">
+              <a14:hiddenFill xmlns:a14="http://schemas.microsoft.com/office/drawing/2010/main">
+                <a:solidFill>
+                  <a:srgbClr val="FFFFFF"/>
+                </a:solidFill>
+              </a14:hiddenFill>
+            </a:ext>
+          </a:extLst>
+        </p:spPr>
+      </p:pic>
+      <p:pic>
+        <p:nvPicPr>
+          <p:cNvPr id="1032" name="Picture 8" descr="Chevrolet Camaro Black Car PNG Image - PngPix">
+            <a:extLst>
+              <a:ext uri="{FF2B5EF4-FFF2-40B4-BE49-F238E27FC236}">
+                <a16:creationId xmlns:a16="http://schemas.microsoft.com/office/drawing/2014/main" id="{CBE77EE0-F650-4157-9C39-296000D9768C}"/>
+              </a:ext>
+            </a:extLst>
+          </p:cNvPr>
+          <p:cNvPicPr>
+            <a:picLocks noChangeAspect="1" noChangeArrowheads="1"/>
+          </p:cNvPicPr>
+          <p:nvPr/>
+        </p:nvPicPr>
+        <p:blipFill>
+          <a:blip r:embed="rId12" cstate="print">
+            <a:extLst>
+              <a:ext uri="{28A0092B-C50C-407E-A947-70E740481C1C}">
+                <a14:useLocalDpi xmlns:a14="http://schemas.microsoft.com/office/drawing/2010/main" val="0"/>
+              </a:ext>
+            </a:extLst>
+          </a:blip>
+          <a:srcRect/>
+          <a:stretch>
+            <a:fillRect/>
+          </a:stretch>
+        </p:blipFill>
+        <p:spPr bwMode="auto">
+          <a:xfrm>
+            <a:off x="-242674" y="3273884"/>
+            <a:ext cx="2103690" cy="1018975"/>
+          </a:xfrm>
+          <a:prstGeom prst="rect">
+            <a:avLst/>
+          </a:prstGeom>
+          <a:noFill/>
+          <a:extLst>
+            <a:ext uri="{909E8E84-426E-40DD-AFC4-6F175D3DCCD1}">
+              <a14:hiddenFill xmlns:a14="http://schemas.microsoft.com/office/drawing/2010/main">
+                <a:solidFill>
+                  <a:srgbClr val="FFFFFF"/>
+                </a:solidFill>
+              </a14:hiddenFill>
+            </a:ext>
+          </a:extLst>
+        </p:spPr>
+      </p:pic>
+      <p:pic>
+        <p:nvPicPr>
+          <p:cNvPr id="1046" name="Picture 22" descr="PNGPIX-COM-McLaren-650S-GT3-Yellow-Race-Car-PNG-Image | simRacer.es">
+            <a:extLst>
+              <a:ext uri="{FF2B5EF4-FFF2-40B4-BE49-F238E27FC236}">
+                <a16:creationId xmlns:a16="http://schemas.microsoft.com/office/drawing/2014/main" id="{84B9A4A3-1329-43A2-B501-DEB19F7157C7}"/>
+              </a:ext>
+            </a:extLst>
+          </p:cNvPr>
+          <p:cNvPicPr>
+            <a:picLocks noChangeAspect="1" noChangeArrowheads="1"/>
+          </p:cNvPicPr>
+          <p:nvPr/>
+        </p:nvPicPr>
+        <p:blipFill rotWithShape="1">
+          <a:blip r:embed="rId13" cstate="print">
+            <a:extLst>
+              <a:ext uri="{28A0092B-C50C-407E-A947-70E740481C1C}">
+                <a14:useLocalDpi xmlns:a14="http://schemas.microsoft.com/office/drawing/2010/main" val="0"/>
+              </a:ext>
+            </a:extLst>
+          </a:blip>
+          <a:srcRect l="1602" r="2214"/>
+          <a:stretch/>
+        </p:blipFill>
+        <p:spPr bwMode="auto">
+          <a:xfrm>
+            <a:off x="-303531" y="5251082"/>
+            <a:ext cx="1903380" cy="768943"/>
+          </a:xfrm>
+          <a:prstGeom prst="rect">
+            <a:avLst/>
+          </a:prstGeom>
+          <a:noFill/>
+          <a:extLst>
+            <a:ext uri="{909E8E84-426E-40DD-AFC4-6F175D3DCCD1}">
+              <a14:hiddenFill xmlns:a14="http://schemas.microsoft.com/office/drawing/2010/main">
+                <a:solidFill>
+                  <a:srgbClr val="FFFFFF"/>
+                </a:solidFill>
+              </a14:hiddenFill>
+            </a:ext>
+          </a:extLst>
+        </p:spPr>
+      </p:pic>
+      <p:pic>
+        <p:nvPicPr>
+          <p:cNvPr id="12" name="Picture 24" descr="Jaguar C X75 James Bond Orange Car PNG Image for Free Download">
+            <a:extLst>
+              <a:ext uri="{FF2B5EF4-FFF2-40B4-BE49-F238E27FC236}">
+                <a16:creationId xmlns:a16="http://schemas.microsoft.com/office/drawing/2014/main" id="{64544ECC-D79A-433F-BB05-FBF8774118AA}"/>
+              </a:ext>
+            </a:extLst>
+          </p:cNvPr>
+          <p:cNvPicPr>
+            <a:picLocks noChangeAspect="1" noChangeArrowheads="1"/>
+          </p:cNvPicPr>
+          <p:nvPr/>
+        </p:nvPicPr>
+        <p:blipFill rotWithShape="1">
+          <a:blip r:embed="rId14" cstate="print">
+            <a:extLst>
+              <a:ext uri="{28A0092B-C50C-407E-A947-70E740481C1C}">
+                <a14:useLocalDpi xmlns:a14="http://schemas.microsoft.com/office/drawing/2010/main" val="0"/>
+              </a:ext>
+            </a:extLst>
+          </a:blip>
+          <a:srcRect l="7013" t="1196" r="4159" b="-1196"/>
+          <a:stretch/>
+        </p:blipFill>
+        <p:spPr bwMode="auto">
+          <a:xfrm>
+            <a:off x="-24597" y="4416293"/>
+            <a:ext cx="1558640" cy="722273"/>
+          </a:xfrm>
+          <a:prstGeom prst="rect">
+            <a:avLst/>
+          </a:prstGeom>
+          <a:noFill/>
+          <a:extLst>
+            <a:ext uri="{909E8E84-426E-40DD-AFC4-6F175D3DCCD1}">
+              <a14:hiddenFill xmlns:a14="http://schemas.microsoft.com/office/drawing/2010/main">
+                <a:solidFill>
+                  <a:srgbClr val="FFFFFF"/>
+                </a:solidFill>
+              </a14:hiddenFill>
+            </a:ext>
+          </a:extLst>
+        </p:spPr>
+      </p:pic>
+      <p:pic>
+        <p:nvPicPr>
+          <p:cNvPr id="1056" name="Picture 32" descr="Pleading Face on WhatsApp 2.19.352">
+            <a:extLst>
+              <a:ext uri="{FF2B5EF4-FFF2-40B4-BE49-F238E27FC236}">
+                <a16:creationId xmlns:a16="http://schemas.microsoft.com/office/drawing/2014/main" id="{AB655029-C09D-4BC0-B8BE-E681CAD9CB18}"/>
+              </a:ext>
+            </a:extLst>
+          </p:cNvPr>
+          <p:cNvPicPr>
+            <a:picLocks noChangeAspect="1" noChangeArrowheads="1"/>
+          </p:cNvPicPr>
+          <p:nvPr/>
+        </p:nvPicPr>
+        <p:blipFill>
+          <a:blip r:embed="rId15">
+            <a:extLst>
+              <a:ext uri="{28A0092B-C50C-407E-A947-70E740481C1C}">
+                <a14:useLocalDpi xmlns:a14="http://schemas.microsoft.com/office/drawing/2010/main" val="0"/>
+              </a:ext>
+            </a:extLst>
+          </a:blip>
+          <a:srcRect/>
+          <a:stretch>
+            <a:fillRect/>
+          </a:stretch>
+        </p:blipFill>
+        <p:spPr bwMode="auto">
+          <a:xfrm>
+            <a:off x="8639944" y="338543"/>
+            <a:ext cx="1008112" cy="1008112"/>
+          </a:xfrm>
+          <a:prstGeom prst="rect">
+            <a:avLst/>
+          </a:prstGeom>
+          <a:noFill/>
+          <a:extLst>
+            <a:ext uri="{909E8E84-426E-40DD-AFC4-6F175D3DCCD1}">
+              <a14:hiddenFill xmlns:a14="http://schemas.microsoft.com/office/drawing/2010/main">
+                <a:solidFill>
+                  <a:srgbClr val="FFFFFF"/>
+                </a:solidFill>
+              </a14:hiddenFill>
+            </a:ext>
+          </a:extLst>
+        </p:spPr>
+      </p:pic>
+      <p:pic>
+        <p:nvPicPr>
+          <p:cNvPr id="1058" name="Picture 34" descr="Lying Face on WhatsApp 2.19.352">
+            <a:extLst>
+              <a:ext uri="{FF2B5EF4-FFF2-40B4-BE49-F238E27FC236}">
+                <a16:creationId xmlns:a16="http://schemas.microsoft.com/office/drawing/2014/main" id="{E1FB9F7C-EF7B-4987-9B31-604468594DE5}"/>
+              </a:ext>
+            </a:extLst>
+          </p:cNvPr>
+          <p:cNvPicPr>
+            <a:picLocks noChangeAspect="1" noChangeArrowheads="1"/>
+          </p:cNvPicPr>
+          <p:nvPr/>
+        </p:nvPicPr>
+        <p:blipFill>
+          <a:blip r:embed="rId16">
+            <a:extLst>
+              <a:ext uri="{28A0092B-C50C-407E-A947-70E740481C1C}">
+                <a14:useLocalDpi xmlns:a14="http://schemas.microsoft.com/office/drawing/2010/main" val="0"/>
+              </a:ext>
+            </a:extLst>
+          </a:blip>
+          <a:srcRect/>
+          <a:stretch>
+            <a:fillRect/>
+          </a:stretch>
+        </p:blipFill>
+        <p:spPr bwMode="auto">
+          <a:xfrm>
+            <a:off x="8660028" y="1346655"/>
+            <a:ext cx="890987" cy="890987"/>
+          </a:xfrm>
+          <a:prstGeom prst="rect">
+            <a:avLst/>
+          </a:prstGeom>
+          <a:noFill/>
+          <a:extLst>
+            <a:ext uri="{909E8E84-426E-40DD-AFC4-6F175D3DCCD1}">
+              <a14:hiddenFill xmlns:a14="http://schemas.microsoft.com/office/drawing/2010/main">
+                <a:solidFill>
+                  <a:srgbClr val="FFFFFF"/>
+                </a:solidFill>
+              </a14:hiddenFill>
+            </a:ext>
+          </a:extLst>
+        </p:spPr>
+      </p:pic>
+      <p:pic>
+        <p:nvPicPr>
+          <p:cNvPr id="1060" name="Picture 36" descr="Face Savoring Food">
+            <a:extLst>
+              <a:ext uri="{FF2B5EF4-FFF2-40B4-BE49-F238E27FC236}">
+                <a16:creationId xmlns:a16="http://schemas.microsoft.com/office/drawing/2014/main" id="{D61ADF46-01A8-4A7B-A631-2E0272F56C01}"/>
+              </a:ext>
+            </a:extLst>
+          </p:cNvPr>
+          <p:cNvPicPr>
+            <a:picLocks noChangeAspect="1" noChangeArrowheads="1"/>
+          </p:cNvPicPr>
+          <p:nvPr/>
+        </p:nvPicPr>
+        <p:blipFill>
+          <a:blip r:embed="rId17">
+            <a:extLst>
+              <a:ext uri="{28A0092B-C50C-407E-A947-70E740481C1C}">
+                <a14:useLocalDpi xmlns:a14="http://schemas.microsoft.com/office/drawing/2010/main" val="0"/>
+              </a:ext>
+            </a:extLst>
+          </a:blip>
+          <a:srcRect/>
+          <a:stretch>
+            <a:fillRect/>
+          </a:stretch>
+        </p:blipFill>
+        <p:spPr bwMode="auto">
+          <a:xfrm>
+            <a:off x="8675945" y="2265921"/>
+            <a:ext cx="890987" cy="890987"/>
+          </a:xfrm>
+          <a:prstGeom prst="rect">
+            <a:avLst/>
+          </a:prstGeom>
+          <a:noFill/>
+          <a:extLst>
+            <a:ext uri="{909E8E84-426E-40DD-AFC4-6F175D3DCCD1}">
+              <a14:hiddenFill xmlns:a14="http://schemas.microsoft.com/office/drawing/2010/main">
+                <a:solidFill>
+                  <a:srgbClr val="FFFFFF"/>
+                </a:solidFill>
+              </a14:hiddenFill>
+            </a:ext>
+          </a:extLst>
+        </p:spPr>
+      </p:pic>
+      <p:pic>
+        <p:nvPicPr>
+          <p:cNvPr id="1062" name="Picture 38" descr="Smiling Face with Heart-Eyes">
+            <a:extLst>
+              <a:ext uri="{FF2B5EF4-FFF2-40B4-BE49-F238E27FC236}">
+                <a16:creationId xmlns:a16="http://schemas.microsoft.com/office/drawing/2014/main" id="{2F004400-B0BA-4E90-B686-FA69EC647A3A}"/>
+              </a:ext>
+            </a:extLst>
+          </p:cNvPr>
+          <p:cNvPicPr>
+            <a:picLocks noChangeAspect="1" noChangeArrowheads="1"/>
+          </p:cNvPicPr>
+          <p:nvPr/>
+        </p:nvPicPr>
+        <p:blipFill>
+          <a:blip r:embed="rId18">
+            <a:extLst>
+              <a:ext uri="{28A0092B-C50C-407E-A947-70E740481C1C}">
+                <a14:useLocalDpi xmlns:a14="http://schemas.microsoft.com/office/drawing/2010/main" val="0"/>
+              </a:ext>
+            </a:extLst>
+          </a:blip>
+          <a:srcRect/>
+          <a:stretch>
+            <a:fillRect/>
+          </a:stretch>
+        </p:blipFill>
+        <p:spPr bwMode="auto">
+          <a:xfrm>
+            <a:off x="8639944" y="3185378"/>
+            <a:ext cx="1008112" cy="1008112"/>
+          </a:xfrm>
+          <a:prstGeom prst="rect">
+            <a:avLst/>
+          </a:prstGeom>
+          <a:noFill/>
+          <a:extLst>
+            <a:ext uri="{909E8E84-426E-40DD-AFC4-6F175D3DCCD1}">
+              <a14:hiddenFill xmlns:a14="http://schemas.microsoft.com/office/drawing/2010/main">
+                <a:solidFill>
+                  <a:srgbClr val="FFFFFF"/>
+                </a:solidFill>
+              </a14:hiddenFill>
+            </a:ext>
+          </a:extLst>
+        </p:spPr>
+      </p:pic>
+      <p:pic>
+        <p:nvPicPr>
+          <p:cNvPr id="1064" name="Picture 40" descr="Face with Medical Mask">
+            <a:extLst>
+              <a:ext uri="{FF2B5EF4-FFF2-40B4-BE49-F238E27FC236}">
+                <a16:creationId xmlns:a16="http://schemas.microsoft.com/office/drawing/2014/main" id="{17F1C05A-4DC0-4044-8793-4B34A5A6883C}"/>
+              </a:ext>
+            </a:extLst>
+          </p:cNvPr>
+          <p:cNvPicPr>
+            <a:picLocks noChangeAspect="1" noChangeArrowheads="1"/>
+          </p:cNvPicPr>
+          <p:nvPr/>
+        </p:nvPicPr>
+        <p:blipFill>
+          <a:blip r:embed="rId19">
+            <a:extLst>
+              <a:ext uri="{28A0092B-C50C-407E-A947-70E740481C1C}">
+                <a14:useLocalDpi xmlns:a14="http://schemas.microsoft.com/office/drawing/2010/main" val="0"/>
+              </a:ext>
+            </a:extLst>
+          </a:blip>
+          <a:srcRect/>
+          <a:stretch>
+            <a:fillRect/>
+          </a:stretch>
+        </p:blipFill>
+        <p:spPr bwMode="auto">
+          <a:xfrm>
+            <a:off x="8601700" y="4221960"/>
+            <a:ext cx="1074003" cy="1074003"/>
+          </a:xfrm>
+          <a:prstGeom prst="rect">
+            <a:avLst/>
+          </a:prstGeom>
+          <a:noFill/>
+          <a:extLst>
+            <a:ext uri="{909E8E84-426E-40DD-AFC4-6F175D3DCCD1}">
+              <a14:hiddenFill xmlns:a14="http://schemas.microsoft.com/office/drawing/2010/main">
+                <a:solidFill>
+                  <a:srgbClr val="FFFFFF"/>
+                </a:solidFill>
+              </a14:hiddenFill>
+            </a:ext>
+          </a:extLst>
+        </p:spPr>
+      </p:pic>
+      <p:pic>
+        <p:nvPicPr>
+          <p:cNvPr id="1066" name="Picture 42" descr="Smiling Face with Sunglasses">
+            <a:extLst>
+              <a:ext uri="{FF2B5EF4-FFF2-40B4-BE49-F238E27FC236}">
+                <a16:creationId xmlns:a16="http://schemas.microsoft.com/office/drawing/2014/main" id="{D30D0BFE-C263-449D-B1A6-860A35AA373E}"/>
+              </a:ext>
+            </a:extLst>
+          </p:cNvPr>
+          <p:cNvPicPr>
+            <a:picLocks noChangeAspect="1" noChangeArrowheads="1"/>
+          </p:cNvPicPr>
+          <p:nvPr/>
+        </p:nvPicPr>
+        <p:blipFill>
+          <a:blip r:embed="rId20">
+            <a:extLst>
+              <a:ext uri="{28A0092B-C50C-407E-A947-70E740481C1C}">
+                <a14:useLocalDpi xmlns:a14="http://schemas.microsoft.com/office/drawing/2010/main" val="0"/>
+              </a:ext>
+            </a:extLst>
+          </a:blip>
+          <a:srcRect/>
+          <a:stretch>
+            <a:fillRect/>
+          </a:stretch>
+        </p:blipFill>
+        <p:spPr bwMode="auto">
+          <a:xfrm>
+            <a:off x="8569740" y="5362793"/>
+            <a:ext cx="1074003" cy="1074003"/>
+          </a:xfrm>
+          <a:prstGeom prst="rect">
+            <a:avLst/>
+          </a:prstGeom>
+          <a:noFill/>
+          <a:extLst>
+            <a:ext uri="{909E8E84-426E-40DD-AFC4-6F175D3DCCD1}">
+              <a14:hiddenFill xmlns:a14="http://schemas.microsoft.com/office/drawing/2010/main">
+                <a:solidFill>
+                  <a:srgbClr val="FFFFFF"/>
+                </a:solidFill>
+              </a14:hiddenFill>
+            </a:ext>
+          </a:extLst>
+        </p:spPr>
+      </p:pic>
+      <p:pic>
+        <p:nvPicPr>
+          <p:cNvPr id="1068" name="Picture 44" descr="Hot Face">
+            <a:extLst>
+              <a:ext uri="{FF2B5EF4-FFF2-40B4-BE49-F238E27FC236}">
+                <a16:creationId xmlns:a16="http://schemas.microsoft.com/office/drawing/2014/main" id="{CF924FF5-1A2B-4CE2-82E4-AA64B485BD05}"/>
+              </a:ext>
+            </a:extLst>
+          </p:cNvPr>
+          <p:cNvPicPr>
+            <a:picLocks noChangeAspect="1" noChangeArrowheads="1"/>
+          </p:cNvPicPr>
+          <p:nvPr/>
+        </p:nvPicPr>
+        <p:blipFill>
+          <a:blip r:embed="rId21">
+            <a:extLst>
+              <a:ext uri="{28A0092B-C50C-407E-A947-70E740481C1C}">
+                <a14:useLocalDpi xmlns:a14="http://schemas.microsoft.com/office/drawing/2010/main" val="0"/>
+              </a:ext>
+            </a:extLst>
+          </a:blip>
+          <a:srcRect/>
+          <a:stretch>
+            <a:fillRect/>
+          </a:stretch>
+        </p:blipFill>
+        <p:spPr bwMode="auto">
+          <a:xfrm>
+            <a:off x="7379594" y="384296"/>
+            <a:ext cx="916606" cy="916606"/>
+          </a:xfrm>
+          <a:prstGeom prst="rect">
+            <a:avLst/>
+          </a:prstGeom>
+          <a:noFill/>
+          <a:extLst>
+            <a:ext uri="{909E8E84-426E-40DD-AFC4-6F175D3DCCD1}">
+              <a14:hiddenFill xmlns:a14="http://schemas.microsoft.com/office/drawing/2010/main">
+                <a:solidFill>
+                  <a:srgbClr val="FFFFFF"/>
+                </a:solidFill>
+              </a14:hiddenFill>
+            </a:ext>
+          </a:extLst>
+        </p:spPr>
+      </p:pic>
+      <p:pic>
+        <p:nvPicPr>
+          <p:cNvPr id="1070" name="Picture 46" descr="Face Screaming in Fear">
+            <a:extLst>
+              <a:ext uri="{FF2B5EF4-FFF2-40B4-BE49-F238E27FC236}">
+                <a16:creationId xmlns:a16="http://schemas.microsoft.com/office/drawing/2014/main" id="{C8C0728E-DD1D-42CA-AB70-2322418B51CB}"/>
+              </a:ext>
+            </a:extLst>
+          </p:cNvPr>
+          <p:cNvPicPr>
+            <a:picLocks noChangeAspect="1" noChangeArrowheads="1"/>
+          </p:cNvPicPr>
+          <p:nvPr/>
+        </p:nvPicPr>
+        <p:blipFill>
+          <a:blip r:embed="rId22">
+            <a:extLst>
+              <a:ext uri="{28A0092B-C50C-407E-A947-70E740481C1C}">
+                <a14:useLocalDpi xmlns:a14="http://schemas.microsoft.com/office/drawing/2010/main" val="0"/>
+              </a:ext>
+            </a:extLst>
+          </a:blip>
+          <a:srcRect/>
+          <a:stretch>
+            <a:fillRect/>
+          </a:stretch>
+        </p:blipFill>
+        <p:spPr bwMode="auto">
+          <a:xfrm>
+            <a:off x="7440959" y="1514836"/>
+            <a:ext cx="901200" cy="901200"/>
+          </a:xfrm>
+          <a:prstGeom prst="rect">
+            <a:avLst/>
+          </a:prstGeom>
+          <a:noFill/>
+          <a:extLst>
+            <a:ext uri="{909E8E84-426E-40DD-AFC4-6F175D3DCCD1}">
+              <a14:hiddenFill xmlns:a14="http://schemas.microsoft.com/office/drawing/2010/main">
+                <a:solidFill>
+                  <a:srgbClr val="FFFFFF"/>
+                </a:solidFill>
+              </a14:hiddenFill>
+            </a:ext>
+          </a:extLst>
+        </p:spPr>
+      </p:pic>
+      <p:pic>
+        <p:nvPicPr>
+          <p:cNvPr id="1072" name="Picture 48" descr="Exploding Head">
+            <a:extLst>
+              <a:ext uri="{FF2B5EF4-FFF2-40B4-BE49-F238E27FC236}">
+                <a16:creationId xmlns:a16="http://schemas.microsoft.com/office/drawing/2014/main" id="{5659E966-176B-41EF-98F6-E003E5178FC6}"/>
+              </a:ext>
+            </a:extLst>
+          </p:cNvPr>
+          <p:cNvPicPr>
+            <a:picLocks noChangeAspect="1" noChangeArrowheads="1"/>
+          </p:cNvPicPr>
+          <p:nvPr/>
+        </p:nvPicPr>
+        <p:blipFill>
+          <a:blip r:embed="rId23">
+            <a:extLst>
+              <a:ext uri="{28A0092B-C50C-407E-A947-70E740481C1C}">
+                <a14:useLocalDpi xmlns:a14="http://schemas.microsoft.com/office/drawing/2010/main" val="0"/>
+              </a:ext>
+            </a:extLst>
+          </a:blip>
+          <a:srcRect/>
+          <a:stretch>
+            <a:fillRect/>
+          </a:stretch>
+        </p:blipFill>
+        <p:spPr bwMode="auto">
+          <a:xfrm>
+            <a:off x="7410471" y="2373509"/>
+            <a:ext cx="935824" cy="935824"/>
+          </a:xfrm>
+          <a:prstGeom prst="rect">
+            <a:avLst/>
+          </a:prstGeom>
+          <a:noFill/>
+          <a:extLst>
+            <a:ext uri="{909E8E84-426E-40DD-AFC4-6F175D3DCCD1}">
+              <a14:hiddenFill xmlns:a14="http://schemas.microsoft.com/office/drawing/2010/main">
+                <a:solidFill>
+                  <a:srgbClr val="FFFFFF"/>
+                </a:solidFill>
+              </a14:hiddenFill>
+            </a:ext>
+          </a:extLst>
+        </p:spPr>
+      </p:pic>
+      <p:pic>
+        <p:nvPicPr>
+          <p:cNvPr id="1074" name="Picture 50" descr="Cowboy Hat Face">
+            <a:extLst>
+              <a:ext uri="{FF2B5EF4-FFF2-40B4-BE49-F238E27FC236}">
+                <a16:creationId xmlns:a16="http://schemas.microsoft.com/office/drawing/2014/main" id="{6C9ABF86-59E8-4CEE-BE4A-82A5858857F1}"/>
+              </a:ext>
+            </a:extLst>
+          </p:cNvPr>
+          <p:cNvPicPr>
+            <a:picLocks noChangeAspect="1" noChangeArrowheads="1"/>
+          </p:cNvPicPr>
+          <p:nvPr/>
+        </p:nvPicPr>
+        <p:blipFill>
+          <a:blip r:embed="rId24">
+            <a:extLst>
+              <a:ext uri="{28A0092B-C50C-407E-A947-70E740481C1C}">
+                <a14:useLocalDpi xmlns:a14="http://schemas.microsoft.com/office/drawing/2010/main" val="0"/>
+              </a:ext>
+            </a:extLst>
+          </a:blip>
+          <a:srcRect/>
+          <a:stretch>
+            <a:fillRect/>
+          </a:stretch>
+        </p:blipFill>
+        <p:spPr bwMode="auto">
+          <a:xfrm>
+            <a:off x="7566256" y="3380758"/>
+            <a:ext cx="734051" cy="734051"/>
+          </a:xfrm>
+          <a:prstGeom prst="rect">
+            <a:avLst/>
+          </a:prstGeom>
+          <a:noFill/>
+          <a:extLst>
+            <a:ext uri="{909E8E84-426E-40DD-AFC4-6F175D3DCCD1}">
+              <a14:hiddenFill xmlns:a14="http://schemas.microsoft.com/office/drawing/2010/main">
+                <a:solidFill>
+                  <a:srgbClr val="FFFFFF"/>
+                </a:solidFill>
+              </a14:hiddenFill>
+            </a:ext>
+          </a:extLst>
+        </p:spPr>
+      </p:pic>
+      <p:pic>
+        <p:nvPicPr>
+          <p:cNvPr id="1076" name="Picture 52" descr="Face with Tears of Joy">
+            <a:extLst>
+              <a:ext uri="{FF2B5EF4-FFF2-40B4-BE49-F238E27FC236}">
+                <a16:creationId xmlns:a16="http://schemas.microsoft.com/office/drawing/2014/main" id="{44A28386-8793-453D-84F8-D18725A34F10}"/>
+              </a:ext>
+            </a:extLst>
+          </p:cNvPr>
+          <p:cNvPicPr>
+            <a:picLocks noChangeAspect="1" noChangeArrowheads="1"/>
+          </p:cNvPicPr>
+          <p:nvPr/>
+        </p:nvPicPr>
+        <p:blipFill>
+          <a:blip r:embed="rId25">
+            <a:extLst>
+              <a:ext uri="{28A0092B-C50C-407E-A947-70E740481C1C}">
+                <a14:useLocalDpi xmlns:a14="http://schemas.microsoft.com/office/drawing/2010/main" val="0"/>
+              </a:ext>
+            </a:extLst>
+          </a:blip>
+          <a:srcRect/>
+          <a:stretch>
+            <a:fillRect/>
+          </a:stretch>
+        </p:blipFill>
+        <p:spPr bwMode="auto">
+          <a:xfrm>
+            <a:off x="7609957" y="4301737"/>
+            <a:ext cx="836829" cy="836829"/>
+          </a:xfrm>
+          <a:prstGeom prst="rect">
+            <a:avLst/>
+          </a:prstGeom>
+          <a:noFill/>
+          <a:extLst>
+            <a:ext uri="{909E8E84-426E-40DD-AFC4-6F175D3DCCD1}">
+              <a14:hiddenFill xmlns:a14="http://schemas.microsoft.com/office/drawing/2010/main">
+                <a:solidFill>
+                  <a:srgbClr val="FFFFFF"/>
+                </a:solidFill>
+              </a14:hiddenFill>
+            </a:ext>
+          </a:extLst>
+        </p:spPr>
+      </p:pic>
+      <p:pic>
+        <p:nvPicPr>
+          <p:cNvPr id="1078" name="Picture 54" descr="Squinting Face with Tongue">
+            <a:extLst>
+              <a:ext uri="{FF2B5EF4-FFF2-40B4-BE49-F238E27FC236}">
+                <a16:creationId xmlns:a16="http://schemas.microsoft.com/office/drawing/2014/main" id="{C5A16080-1BD7-4422-9B9B-780E4DD0D96F}"/>
+              </a:ext>
+            </a:extLst>
+          </p:cNvPr>
+          <p:cNvPicPr>
+            <a:picLocks noChangeAspect="1" noChangeArrowheads="1"/>
+          </p:cNvPicPr>
+          <p:nvPr/>
+        </p:nvPicPr>
+        <p:blipFill>
+          <a:blip r:embed="rId26">
+            <a:extLst>
+              <a:ext uri="{28A0092B-C50C-407E-A947-70E740481C1C}">
+                <a14:useLocalDpi xmlns:a14="http://schemas.microsoft.com/office/drawing/2010/main" val="0"/>
+              </a:ext>
+            </a:extLst>
+          </a:blip>
+          <a:srcRect/>
+          <a:stretch>
+            <a:fillRect/>
+          </a:stretch>
+        </p:blipFill>
+        <p:spPr bwMode="auto">
+          <a:xfrm>
+            <a:off x="7410471" y="5311149"/>
+            <a:ext cx="1022958" cy="1022958"/>
+          </a:xfrm>
+          <a:prstGeom prst="rect">
+            <a:avLst/>
+          </a:prstGeom>
+          <a:noFill/>
+          <a:extLst>
+            <a:ext uri="{909E8E84-426E-40DD-AFC4-6F175D3DCCD1}">
+              <a14:hiddenFill xmlns:a14="http://schemas.microsoft.com/office/drawing/2010/main">
+                <a:solidFill>
+                  <a:srgbClr val="FFFFFF"/>
+                </a:solidFill>
+              </a14:hiddenFill>
+            </a:ext>
+          </a:extLst>
+        </p:spPr>
+      </p:pic>
+      <p:pic>
+        <p:nvPicPr>
+          <p:cNvPr id="15" name="Imagen 14" descr="Imagen que contiene rojo, amarillo, alimentos, blanco&#10;&#10;Descripción generada automáticamente">
+            <a:extLst>
+              <a:ext uri="{FF2B5EF4-FFF2-40B4-BE49-F238E27FC236}">
+                <a16:creationId xmlns:a16="http://schemas.microsoft.com/office/drawing/2014/main" id="{AB446CB3-76E9-4CF3-B9B3-BC8492E443E3}"/>
+              </a:ext>
+            </a:extLst>
+          </p:cNvPr>
+          <p:cNvPicPr>
+            <a:picLocks noChangeAspect="1"/>
+          </p:cNvPicPr>
+          <p:nvPr/>
+        </p:nvPicPr>
+        <p:blipFill>
+          <a:blip r:embed="rId27">
+            <a:extLst>
+              <a:ext uri="{28A0092B-C50C-407E-A947-70E740481C1C}">
+                <a14:useLocalDpi xmlns:a14="http://schemas.microsoft.com/office/drawing/2010/main" val="0"/>
+              </a:ext>
+            </a:extLst>
+          </a:blip>
+          <a:stretch>
+            <a:fillRect/>
+          </a:stretch>
+        </p:blipFill>
+        <p:spPr>
+          <a:xfrm>
+            <a:off x="2794245" y="865647"/>
+            <a:ext cx="3547238" cy="5143501"/>
+          </a:xfrm>
+          <a:prstGeom prst="rect">
+            <a:avLst/>
+          </a:prstGeom>
+        </p:spPr>
+      </p:pic>
+      <p:pic>
+        <p:nvPicPr>
+          <p:cNvPr id="1080" name="Picture 56" descr="Cold Face">
+            <a:extLst>
+              <a:ext uri="{FF2B5EF4-FFF2-40B4-BE49-F238E27FC236}">
+                <a16:creationId xmlns:a16="http://schemas.microsoft.com/office/drawing/2014/main" id="{1DDEB8D6-3A6D-4753-9E0E-E3D51EA8BD7A}"/>
+              </a:ext>
+            </a:extLst>
+          </p:cNvPr>
+          <p:cNvPicPr>
+            <a:picLocks noChangeAspect="1" noChangeArrowheads="1"/>
+          </p:cNvPicPr>
+          <p:nvPr/>
+        </p:nvPicPr>
+        <p:blipFill>
+          <a:blip r:embed="rId28">
+            <a:extLst>
+              <a:ext uri="{28A0092B-C50C-407E-A947-70E740481C1C}">
+                <a14:useLocalDpi xmlns:a14="http://schemas.microsoft.com/office/drawing/2010/main" val="0"/>
+              </a:ext>
+            </a:extLst>
+          </a:blip>
+          <a:srcRect/>
+          <a:stretch>
+            <a:fillRect/>
+          </a:stretch>
+        </p:blipFill>
+        <p:spPr bwMode="auto">
+          <a:xfrm>
+            <a:off x="2266878" y="-642102"/>
+            <a:ext cx="1457628" cy="1457628"/>
+          </a:xfrm>
+          <a:prstGeom prst="rect">
+            <a:avLst/>
+          </a:prstGeom>
+          <a:noFill/>
+          <a:extLst>
+            <a:ext uri="{909E8E84-426E-40DD-AFC4-6F175D3DCCD1}">
+              <a14:hiddenFill xmlns:a14="http://schemas.microsoft.com/office/drawing/2010/main">
+                <a:solidFill>
+                  <a:srgbClr val="FFFFFF"/>
+                </a:solidFill>
+              </a14:hiddenFill>
+            </a:ext>
+          </a:extLst>
+        </p:spPr>
+      </p:pic>
+      <p:pic>
+        <p:nvPicPr>
+          <p:cNvPr id="1082" name="Picture 58" descr="Glowing Star on WhatsApp 2.19.352">
+            <a:extLst>
+              <a:ext uri="{FF2B5EF4-FFF2-40B4-BE49-F238E27FC236}">
+                <a16:creationId xmlns:a16="http://schemas.microsoft.com/office/drawing/2014/main" id="{E5F499F0-A1BF-4CA1-891F-A84B7E105577}"/>
+              </a:ext>
+            </a:extLst>
+          </p:cNvPr>
+          <p:cNvPicPr>
+            <a:picLocks noChangeAspect="1" noChangeArrowheads="1"/>
+          </p:cNvPicPr>
+          <p:nvPr/>
+        </p:nvPicPr>
+        <p:blipFill>
+          <a:blip r:embed="rId29">
+            <a:extLst>
+              <a:ext uri="{28A0092B-C50C-407E-A947-70E740481C1C}">
+                <a14:useLocalDpi xmlns:a14="http://schemas.microsoft.com/office/drawing/2010/main" val="0"/>
+              </a:ext>
+            </a:extLst>
+          </a:blip>
+          <a:srcRect/>
+          <a:stretch>
+            <a:fillRect/>
+          </a:stretch>
+        </p:blipFill>
+        <p:spPr bwMode="auto">
+          <a:xfrm>
+            <a:off x="4209348" y="-605074"/>
+            <a:ext cx="1210148" cy="1210148"/>
+          </a:xfrm>
+          <a:prstGeom prst="rect">
+            <a:avLst/>
+          </a:prstGeom>
+          <a:noFill/>
+          <a:extLst>
+            <a:ext uri="{909E8E84-426E-40DD-AFC4-6F175D3DCCD1}">
+              <a14:hiddenFill xmlns:a14="http://schemas.microsoft.com/office/drawing/2010/main">
+                <a:solidFill>
+                  <a:srgbClr val="FFFFFF"/>
+                </a:solidFill>
+              </a14:hiddenFill>
+            </a:ext>
+          </a:extLst>
+        </p:spPr>
+      </p:pic>
+      <p:pic>
+        <p:nvPicPr>
+          <p:cNvPr id="1084" name="Picture 60" descr="Money-Mouth Face on WhatsApp 2.19.352">
+            <a:extLst>
+              <a:ext uri="{FF2B5EF4-FFF2-40B4-BE49-F238E27FC236}">
+                <a16:creationId xmlns:a16="http://schemas.microsoft.com/office/drawing/2014/main" id="{C7E2A5BE-B1F7-4CB5-926C-0E82972CD0C4}"/>
+              </a:ext>
+            </a:extLst>
+          </p:cNvPr>
+          <p:cNvPicPr>
+            <a:picLocks noChangeAspect="1" noChangeArrowheads="1"/>
+          </p:cNvPicPr>
+          <p:nvPr/>
+        </p:nvPicPr>
+        <p:blipFill>
+          <a:blip r:embed="rId30">
+            <a:extLst>
+              <a:ext uri="{28A0092B-C50C-407E-A947-70E740481C1C}">
+                <a14:useLocalDpi xmlns:a14="http://schemas.microsoft.com/office/drawing/2010/main" val="0"/>
+              </a:ext>
+            </a:extLst>
+          </a:blip>
+          <a:srcRect/>
+          <a:stretch>
+            <a:fillRect/>
+          </a:stretch>
+        </p:blipFill>
+        <p:spPr bwMode="auto">
+          <a:xfrm>
+            <a:off x="2887718" y="1693279"/>
+            <a:ext cx="3374958" cy="3374958"/>
+          </a:xfrm>
+          <a:prstGeom prst="rect">
+            <a:avLst/>
+          </a:prstGeom>
+          <a:noFill/>
+          <a:extLst>
+            <a:ext uri="{909E8E84-426E-40DD-AFC4-6F175D3DCCD1}">
+              <a14:hiddenFill xmlns:a14="http://schemas.microsoft.com/office/drawing/2010/main">
+                <a:solidFill>
+                  <a:srgbClr val="FFFFFF"/>
+                </a:solidFill>
+              </a14:hiddenFill>
+            </a:ext>
+          </a:extLst>
         </p:spPr>
       </p:pic>
     </p:spTree>

</xml_diff>